<commit_message>
Équie et archivage terminés
Backend équipe terminé ainsi que l'archivage du site qui est
fonctionnel.
</commit_message>
<xml_diff>
--- a/Web/images/Présentation1.pptx
+++ b/Web/images/Présentation1.pptx
@@ -245,7 +245,7 @@
           <a:p>
             <a:fld id="{DFC0D7DB-B500-40ED-8335-8239FE6A3602}" type="datetimeFigureOut">
               <a:rPr lang="fr-FR" smtClean="0"/>
-              <a:t>06/02/2014</a:t>
+              <a:t>27/08/2014</a:t>
             </a:fld>
             <a:endParaRPr lang="fr-FR"/>
           </a:p>
@@ -415,7 +415,7 @@
           <a:p>
             <a:fld id="{DFC0D7DB-B500-40ED-8335-8239FE6A3602}" type="datetimeFigureOut">
               <a:rPr lang="fr-FR" smtClean="0"/>
-              <a:t>06/02/2014</a:t>
+              <a:t>27/08/2014</a:t>
             </a:fld>
             <a:endParaRPr lang="fr-FR"/>
           </a:p>
@@ -595,7 +595,7 @@
           <a:p>
             <a:fld id="{DFC0D7DB-B500-40ED-8335-8239FE6A3602}" type="datetimeFigureOut">
               <a:rPr lang="fr-FR" smtClean="0"/>
-              <a:t>06/02/2014</a:t>
+              <a:t>27/08/2014</a:t>
             </a:fld>
             <a:endParaRPr lang="fr-FR"/>
           </a:p>
@@ -765,7 +765,7 @@
           <a:p>
             <a:fld id="{DFC0D7DB-B500-40ED-8335-8239FE6A3602}" type="datetimeFigureOut">
               <a:rPr lang="fr-FR" smtClean="0"/>
-              <a:t>06/02/2014</a:t>
+              <a:t>27/08/2014</a:t>
             </a:fld>
             <a:endParaRPr lang="fr-FR"/>
           </a:p>
@@ -1011,7 +1011,7 @@
           <a:p>
             <a:fld id="{DFC0D7DB-B500-40ED-8335-8239FE6A3602}" type="datetimeFigureOut">
               <a:rPr lang="fr-FR" smtClean="0"/>
-              <a:t>06/02/2014</a:t>
+              <a:t>27/08/2014</a:t>
             </a:fld>
             <a:endParaRPr lang="fr-FR"/>
           </a:p>
@@ -1243,7 +1243,7 @@
           <a:p>
             <a:fld id="{DFC0D7DB-B500-40ED-8335-8239FE6A3602}" type="datetimeFigureOut">
               <a:rPr lang="fr-FR" smtClean="0"/>
-              <a:t>06/02/2014</a:t>
+              <a:t>27/08/2014</a:t>
             </a:fld>
             <a:endParaRPr lang="fr-FR"/>
           </a:p>
@@ -1610,7 +1610,7 @@
           <a:p>
             <a:fld id="{DFC0D7DB-B500-40ED-8335-8239FE6A3602}" type="datetimeFigureOut">
               <a:rPr lang="fr-FR" smtClean="0"/>
-              <a:t>06/02/2014</a:t>
+              <a:t>27/08/2014</a:t>
             </a:fld>
             <a:endParaRPr lang="fr-FR"/>
           </a:p>
@@ -1728,7 +1728,7 @@
           <a:p>
             <a:fld id="{DFC0D7DB-B500-40ED-8335-8239FE6A3602}" type="datetimeFigureOut">
               <a:rPr lang="fr-FR" smtClean="0"/>
-              <a:t>06/02/2014</a:t>
+              <a:t>27/08/2014</a:t>
             </a:fld>
             <a:endParaRPr lang="fr-FR"/>
           </a:p>
@@ -1823,7 +1823,7 @@
           <a:p>
             <a:fld id="{DFC0D7DB-B500-40ED-8335-8239FE6A3602}" type="datetimeFigureOut">
               <a:rPr lang="fr-FR" smtClean="0"/>
-              <a:t>06/02/2014</a:t>
+              <a:t>27/08/2014</a:t>
             </a:fld>
             <a:endParaRPr lang="fr-FR"/>
           </a:p>
@@ -2100,7 +2100,7 @@
           <a:p>
             <a:fld id="{DFC0D7DB-B500-40ED-8335-8239FE6A3602}" type="datetimeFigureOut">
               <a:rPr lang="fr-FR" smtClean="0"/>
-              <a:t>06/02/2014</a:t>
+              <a:t>27/08/2014</a:t>
             </a:fld>
             <a:endParaRPr lang="fr-FR"/>
           </a:p>
@@ -2353,7 +2353,7 @@
           <a:p>
             <a:fld id="{DFC0D7DB-B500-40ED-8335-8239FE6A3602}" type="datetimeFigureOut">
               <a:rPr lang="fr-FR" smtClean="0"/>
-              <a:t>06/02/2014</a:t>
+              <a:t>27/08/2014</a:t>
             </a:fld>
             <a:endParaRPr lang="fr-FR"/>
           </a:p>
@@ -2566,7 +2566,7 @@
           <a:p>
             <a:fld id="{DFC0D7DB-B500-40ED-8335-8239FE6A3602}" type="datetimeFigureOut">
               <a:rPr lang="fr-FR" smtClean="0"/>
-              <a:t>06/02/2014</a:t>
+              <a:t>27/08/2014</a:t>
             </a:fld>
             <a:endParaRPr lang="fr-FR"/>
           </a:p>
@@ -3374,6 +3374,14 @@
 <file path=ppt/slides/slide3.xml><?xml version="1.0" encoding="utf-8"?>
 <p:sld xmlns:a="http://schemas.openxmlformats.org/drawingml/2006/main" xmlns:r="http://schemas.openxmlformats.org/officeDocument/2006/relationships" xmlns:p="http://schemas.openxmlformats.org/presentationml/2006/main">
   <p:cSld>
+    <p:bg>
+      <p:bgPr>
+        <a:solidFill>
+          <a:srgbClr val="00B0F0"/>
+        </a:solidFill>
+        <a:effectLst/>
+      </p:bgPr>
+    </p:bg>
     <p:spTree>
       <p:nvGrpSpPr>
         <p:cNvPr id="1" name=""/>
@@ -3396,7 +3404,7 @@
         </p:nvSpPr>
         <p:spPr>
           <a:xfrm>
-            <a:off x="4311294" y="2516970"/>
+            <a:off x="393921" y="293315"/>
             <a:ext cx="1366080" cy="1862048"/>
           </a:xfrm>
           <a:prstGeom prst="rect">
@@ -3417,6 +3425,398 @@
               </a:rPr>
               <a:t>✔</a:t>
             </a:r>
+          </a:p>
+        </p:txBody>
+      </p:sp>
+      <p:sp>
+        <p:nvSpPr>
+          <p:cNvPr id="2" name="Bouée 1"/>
+          <p:cNvSpPr/>
+          <p:nvPr/>
+        </p:nvSpPr>
+        <p:spPr>
+          <a:xfrm>
+            <a:off x="3117273" y="862445"/>
+            <a:ext cx="4320000" cy="4320000"/>
+          </a:xfrm>
+          <a:prstGeom prst="donut">
+            <a:avLst>
+              <a:gd name="adj" fmla="val 8010"/>
+            </a:avLst>
+          </a:prstGeom>
+          <a:solidFill>
+            <a:schemeClr val="bg1"/>
+          </a:solidFill>
+          <a:ln>
+            <a:solidFill>
+              <a:schemeClr val="bg1"/>
+            </a:solidFill>
+          </a:ln>
+        </p:spPr>
+        <p:style>
+          <a:lnRef idx="2">
+            <a:schemeClr val="accent1">
+              <a:shade val="50000"/>
+            </a:schemeClr>
+          </a:lnRef>
+          <a:fillRef idx="1">
+            <a:schemeClr val="accent1"/>
+          </a:fillRef>
+          <a:effectRef idx="0">
+            <a:schemeClr val="accent1"/>
+          </a:effectRef>
+          <a:fontRef idx="minor">
+            <a:schemeClr val="lt1"/>
+          </a:fontRef>
+        </p:style>
+        <p:txBody>
+          <a:bodyPr rtlCol="0" anchor="ctr"/>
+          <a:lstStyle/>
+          <a:p>
+            <a:pPr algn="ctr"/>
+            <a:endParaRPr lang="fr-FR">
+              <a:solidFill>
+                <a:schemeClr val="tx1"/>
+              </a:solidFill>
+            </a:endParaRPr>
+          </a:p>
+        </p:txBody>
+      </p:sp>
+      <p:sp>
+        <p:nvSpPr>
+          <p:cNvPr id="3" name="Rectangle 2"/>
+          <p:cNvSpPr/>
+          <p:nvPr/>
+        </p:nvSpPr>
+        <p:spPr>
+          <a:xfrm>
+            <a:off x="5164931" y="1417463"/>
+            <a:ext cx="230982" cy="475200"/>
+          </a:xfrm>
+          <a:prstGeom prst="rect">
+            <a:avLst/>
+          </a:prstGeom>
+          <a:solidFill>
+            <a:schemeClr val="bg1"/>
+          </a:solidFill>
+          <a:ln>
+            <a:solidFill>
+              <a:schemeClr val="bg1"/>
+            </a:solidFill>
+          </a:ln>
+        </p:spPr>
+        <p:style>
+          <a:lnRef idx="2">
+            <a:schemeClr val="accent1">
+              <a:shade val="50000"/>
+            </a:schemeClr>
+          </a:lnRef>
+          <a:fillRef idx="1">
+            <a:schemeClr val="accent1"/>
+          </a:fillRef>
+          <a:effectRef idx="0">
+            <a:schemeClr val="accent1"/>
+          </a:effectRef>
+          <a:fontRef idx="minor">
+            <a:schemeClr val="lt1"/>
+          </a:fontRef>
+        </p:style>
+        <p:txBody>
+          <a:bodyPr rtlCol="0" anchor="ctr"/>
+          <a:lstStyle/>
+          <a:p>
+            <a:pPr algn="ctr"/>
+            <a:endParaRPr lang="fr-FR"/>
+          </a:p>
+        </p:txBody>
+      </p:sp>
+      <p:sp>
+        <p:nvSpPr>
+          <p:cNvPr id="5" name="Rectangle 4"/>
+          <p:cNvSpPr/>
+          <p:nvPr/>
+        </p:nvSpPr>
+        <p:spPr>
+          <a:xfrm>
+            <a:off x="5164931" y="4164806"/>
+            <a:ext cx="230982" cy="475654"/>
+          </a:xfrm>
+          <a:prstGeom prst="rect">
+            <a:avLst/>
+          </a:prstGeom>
+          <a:solidFill>
+            <a:schemeClr val="bg1"/>
+          </a:solidFill>
+          <a:ln>
+            <a:solidFill>
+              <a:schemeClr val="bg1"/>
+            </a:solidFill>
+          </a:ln>
+        </p:spPr>
+        <p:style>
+          <a:lnRef idx="2">
+            <a:schemeClr val="accent1">
+              <a:shade val="50000"/>
+            </a:schemeClr>
+          </a:lnRef>
+          <a:fillRef idx="1">
+            <a:schemeClr val="accent1"/>
+          </a:fillRef>
+          <a:effectRef idx="0">
+            <a:schemeClr val="accent1"/>
+          </a:effectRef>
+          <a:fontRef idx="minor">
+            <a:schemeClr val="lt1"/>
+          </a:fontRef>
+        </p:style>
+        <p:txBody>
+          <a:bodyPr rtlCol="0" anchor="ctr"/>
+          <a:lstStyle/>
+          <a:p>
+            <a:pPr algn="ctr"/>
+            <a:endParaRPr lang="fr-FR"/>
+          </a:p>
+        </p:txBody>
+      </p:sp>
+      <p:sp>
+        <p:nvSpPr>
+          <p:cNvPr id="6" name="Rectangle 5"/>
+          <p:cNvSpPr/>
+          <p:nvPr/>
+        </p:nvSpPr>
+        <p:spPr>
+          <a:xfrm rot="5400000">
+            <a:off x="6553680" y="2784847"/>
+            <a:ext cx="230401" cy="475200"/>
+          </a:xfrm>
+          <a:prstGeom prst="rect">
+            <a:avLst/>
+          </a:prstGeom>
+          <a:solidFill>
+            <a:schemeClr val="bg1"/>
+          </a:solidFill>
+          <a:ln>
+            <a:solidFill>
+              <a:schemeClr val="bg1"/>
+            </a:solidFill>
+          </a:ln>
+        </p:spPr>
+        <p:style>
+          <a:lnRef idx="2">
+            <a:schemeClr val="accent1">
+              <a:shade val="50000"/>
+            </a:schemeClr>
+          </a:lnRef>
+          <a:fillRef idx="1">
+            <a:schemeClr val="accent1"/>
+          </a:fillRef>
+          <a:effectRef idx="0">
+            <a:schemeClr val="accent1"/>
+          </a:effectRef>
+          <a:fontRef idx="minor">
+            <a:schemeClr val="lt1"/>
+          </a:fontRef>
+        </p:style>
+        <p:txBody>
+          <a:bodyPr rtlCol="0" anchor="ctr"/>
+          <a:lstStyle/>
+          <a:p>
+            <a:pPr algn="ctr"/>
+            <a:endParaRPr lang="fr-FR"/>
+          </a:p>
+        </p:txBody>
+      </p:sp>
+      <p:sp>
+        <p:nvSpPr>
+          <p:cNvPr id="7" name="Rectangle 6"/>
+          <p:cNvSpPr/>
+          <p:nvPr/>
+        </p:nvSpPr>
+        <p:spPr>
+          <a:xfrm rot="5400000">
+            <a:off x="3837156" y="2784845"/>
+            <a:ext cx="230400" cy="475200"/>
+          </a:xfrm>
+          <a:prstGeom prst="rect">
+            <a:avLst/>
+          </a:prstGeom>
+          <a:solidFill>
+            <a:schemeClr val="bg1"/>
+          </a:solidFill>
+          <a:ln>
+            <a:solidFill>
+              <a:schemeClr val="bg1"/>
+            </a:solidFill>
+          </a:ln>
+        </p:spPr>
+        <p:style>
+          <a:lnRef idx="2">
+            <a:schemeClr val="accent1">
+              <a:shade val="50000"/>
+            </a:schemeClr>
+          </a:lnRef>
+          <a:fillRef idx="1">
+            <a:schemeClr val="accent1"/>
+          </a:fillRef>
+          <a:effectRef idx="0">
+            <a:schemeClr val="accent1"/>
+          </a:effectRef>
+          <a:fontRef idx="minor">
+            <a:schemeClr val="lt1"/>
+          </a:fontRef>
+        </p:style>
+        <p:txBody>
+          <a:bodyPr rtlCol="0" anchor="ctr"/>
+          <a:lstStyle/>
+          <a:p>
+            <a:pPr algn="ctr"/>
+            <a:endParaRPr lang="fr-FR"/>
+          </a:p>
+        </p:txBody>
+      </p:sp>
+      <p:sp>
+        <p:nvSpPr>
+          <p:cNvPr id="8" name="Rectangle 7"/>
+          <p:cNvSpPr/>
+          <p:nvPr/>
+        </p:nvSpPr>
+        <p:spPr>
+          <a:xfrm rot="2090623">
+            <a:off x="4888431" y="2804978"/>
+            <a:ext cx="248257" cy="1248245"/>
+          </a:xfrm>
+          <a:prstGeom prst="rect">
+            <a:avLst/>
+          </a:prstGeom>
+          <a:solidFill>
+            <a:schemeClr val="bg1"/>
+          </a:solidFill>
+          <a:ln>
+            <a:solidFill>
+              <a:schemeClr val="bg1"/>
+            </a:solidFill>
+          </a:ln>
+        </p:spPr>
+        <p:style>
+          <a:lnRef idx="2">
+            <a:schemeClr val="accent1">
+              <a:shade val="50000"/>
+            </a:schemeClr>
+          </a:lnRef>
+          <a:fillRef idx="1">
+            <a:schemeClr val="accent1"/>
+          </a:fillRef>
+          <a:effectRef idx="0">
+            <a:schemeClr val="accent1"/>
+          </a:effectRef>
+          <a:fontRef idx="minor">
+            <a:schemeClr val="lt1"/>
+          </a:fontRef>
+        </p:style>
+        <p:txBody>
+          <a:bodyPr rtlCol="0" anchor="ctr"/>
+          <a:lstStyle/>
+          <a:p>
+            <a:pPr algn="ctr"/>
+            <a:endParaRPr lang="fr-FR"/>
+          </a:p>
+        </p:txBody>
+      </p:sp>
+      <p:sp>
+        <p:nvSpPr>
+          <p:cNvPr id="9" name="Rectangle 8"/>
+          <p:cNvSpPr/>
+          <p:nvPr/>
+        </p:nvSpPr>
+        <p:spPr>
+          <a:xfrm rot="8153019">
+            <a:off x="4645992" y="1572506"/>
+            <a:ext cx="269167" cy="1733061"/>
+          </a:xfrm>
+          <a:prstGeom prst="rect">
+            <a:avLst/>
+          </a:prstGeom>
+          <a:solidFill>
+            <a:schemeClr val="bg1"/>
+          </a:solidFill>
+          <a:ln>
+            <a:solidFill>
+              <a:schemeClr val="bg1"/>
+            </a:solidFill>
+          </a:ln>
+        </p:spPr>
+        <p:style>
+          <a:lnRef idx="2">
+            <a:schemeClr val="accent1">
+              <a:shade val="50000"/>
+            </a:schemeClr>
+          </a:lnRef>
+          <a:fillRef idx="1">
+            <a:schemeClr val="accent1"/>
+          </a:fillRef>
+          <a:effectRef idx="0">
+            <a:schemeClr val="accent1"/>
+          </a:effectRef>
+          <a:fontRef idx="minor">
+            <a:schemeClr val="lt1"/>
+          </a:fontRef>
+        </p:style>
+        <p:txBody>
+          <a:bodyPr rtlCol="0" anchor="ctr"/>
+          <a:lstStyle/>
+          <a:p>
+            <a:pPr algn="ctr"/>
+            <a:endParaRPr lang="fr-FR"/>
+          </a:p>
+        </p:txBody>
+      </p:sp>
+      <p:sp>
+        <p:nvSpPr>
+          <p:cNvPr id="10" name="Croix 9"/>
+          <p:cNvSpPr/>
+          <p:nvPr/>
+        </p:nvSpPr>
+        <p:spPr>
+          <a:xfrm>
+            <a:off x="8820150" y="1417465"/>
+            <a:ext cx="2160000" cy="2160000"/>
+          </a:xfrm>
+          <a:prstGeom prst="plus">
+            <a:avLst>
+              <a:gd name="adj" fmla="val 40434"/>
+            </a:avLst>
+          </a:prstGeom>
+          <a:solidFill>
+            <a:schemeClr val="bg1"/>
+          </a:solidFill>
+          <a:ln>
+            <a:solidFill>
+              <a:schemeClr val="bg1"/>
+            </a:solidFill>
+          </a:ln>
+        </p:spPr>
+        <p:style>
+          <a:lnRef idx="2">
+            <a:schemeClr val="accent1">
+              <a:shade val="50000"/>
+            </a:schemeClr>
+          </a:lnRef>
+          <a:fillRef idx="1">
+            <a:schemeClr val="accent1"/>
+          </a:fillRef>
+          <a:effectRef idx="0">
+            <a:schemeClr val="accent1"/>
+          </a:effectRef>
+          <a:fontRef idx="minor">
+            <a:schemeClr val="lt1"/>
+          </a:fontRef>
+        </p:style>
+        <p:txBody>
+          <a:bodyPr rtlCol="0" anchor="ctr"/>
+          <a:lstStyle/>
+          <a:p>
+            <a:pPr algn="ctr"/>
+            <a:endParaRPr lang="fr-FR"/>
           </a:p>
         </p:txBody>
       </p:sp>

</xml_diff>